<commit_message>
updated heroku link in powerpoint
</commit_message>
<xml_diff>
--- a/Project 2.pptx
+++ b/Project 2.pptx
@@ -8136,7 +8136,7 @@
               <a:buNone/>
             </a:pPr>
             <a:r>
-              <a:rPr lang="en-US" b="1" dirty="0">
+              <a:rPr lang="en-US" b="1">
                 <a:solidFill>
                   <a:srgbClr val="FFFF00"/>
                 </a:solidFill>
@@ -8144,10 +8144,10 @@
               <a:t>	</a:t>
             </a:r>
             <a:r>
-              <a:rPr lang="en-US" sz="1600" u="sng" dirty="0">
+              <a:rPr lang="en-US" sz="1600">
                 <a:hlinkClick r:id="rId4"/>
               </a:rPr>
-              <a:t>https://fathomless-refuge-38360.herokuapp.com/</a:t>
+              <a:t>https://cryptic-oasis-97928.herokuapp.com/</a:t>
             </a:r>
             <a:endParaRPr lang="en-US" sz="1600" b="1" dirty="0">
               <a:solidFill>

</xml_diff>

<commit_message>
updated powerpoint heroku link
</commit_message>
<xml_diff>
--- a/Project 2.pptx
+++ b/Project 2.pptx
@@ -8144,10 +8144,10 @@
               <a:t>	</a:t>
             </a:r>
             <a:r>
-              <a:rPr lang="en-US" sz="1600" u="sng" dirty="0">
+              <a:rPr lang="en-US" sz="1600" dirty="0">
                 <a:hlinkClick r:id="rId4"/>
               </a:rPr>
-              <a:t>https://fathomless-refuge-38360.herokuapp.com/</a:t>
+              <a:t>https://cryptic-oasis-97928.herokuapp.com/</a:t>
             </a:r>
             <a:endParaRPr lang="en-US" sz="1600" b="1" dirty="0">
               <a:solidFill>

</xml_diff>